<commit_message>
Update icra 13 may.
</commit_message>
<xml_diff>
--- a/tags/main.pptx
+++ b/tags/main.pptx
@@ -506,7 +506,7 @@
 </file>
 
 <file path=ppt/slideLayouts/slideLayout1.xml><?xml version="1.0" encoding="utf-8"?>
-<p:sldLayout xmlns:a="http://schemas.openxmlformats.org/drawingml/2006/main" xmlns:r="http://schemas.openxmlformats.org/officeDocument/2006/relationships" xmlns:p="http://schemas.openxmlformats.org/presentationml/2006/main" type="obj" preserve="1">
+<p:sldLayout xmlns:a="http://schemas.openxmlformats.org/drawingml/2006/main" xmlns:r="http://schemas.openxmlformats.org/officeDocument/2006/relationships" xmlns:p="http://schemas.openxmlformats.org/presentationml/2006/main" showMasterSp="0" type="obj" preserve="1">
   <p:cSld name="Title Slide">
     <p:spTree>
       <p:nvGrpSpPr>
@@ -644,7 +644,7 @@
           <a:p>
             <a:fld id="{1D8BD707-D9CF-40AE-B4C6-C98DA3205C09}" type="datetimeFigureOut">
               <a:rPr lang="en-US"/>
-              <a:t>5/7/24</a:t>
+              <a:t>5/8/24</a:t>
             </a:fld>
             <a:endParaRPr lang="en-US"/>
           </a:p>
@@ -691,7 +691,7 @@
 </file>
 
 <file path=ppt/slideLayouts/slideLayout2.xml><?xml version="1.0" encoding="utf-8"?>
-<p:sldLayout xmlns:a="http://schemas.openxmlformats.org/drawingml/2006/main" xmlns:r="http://schemas.openxmlformats.org/officeDocument/2006/relationships" xmlns:p="http://schemas.openxmlformats.org/presentationml/2006/main" type="obj" preserve="1">
+<p:sldLayout xmlns:a="http://schemas.openxmlformats.org/drawingml/2006/main" xmlns:r="http://schemas.openxmlformats.org/officeDocument/2006/relationships" xmlns:p="http://schemas.openxmlformats.org/presentationml/2006/main" showMasterSp="0" type="obj" preserve="1">
   <p:cSld name="Title and Content">
     <p:spTree>
       <p:nvGrpSpPr>
@@ -809,7 +809,7 @@
           <a:p>
             <a:fld id="{1D8BD707-D9CF-40AE-B4C6-C98DA3205C09}" type="datetimeFigureOut">
               <a:rPr lang="en-US"/>
-              <a:t>5/7/24</a:t>
+              <a:t>5/8/24</a:t>
             </a:fld>
             <a:endParaRPr lang="en-US"/>
           </a:p>
@@ -856,7 +856,7 @@
 </file>
 
 <file path=ppt/slideLayouts/slideLayout3.xml><?xml version="1.0" encoding="utf-8"?>
-<p:sldLayout xmlns:a="http://schemas.openxmlformats.org/drawingml/2006/main" xmlns:r="http://schemas.openxmlformats.org/officeDocument/2006/relationships" xmlns:p="http://schemas.openxmlformats.org/presentationml/2006/main" type="obj" preserve="1">
+<p:sldLayout xmlns:a="http://schemas.openxmlformats.org/drawingml/2006/main" xmlns:r="http://schemas.openxmlformats.org/officeDocument/2006/relationships" xmlns:p="http://schemas.openxmlformats.org/presentationml/2006/main" showMasterSp="0" type="obj" preserve="1">
   <p:cSld name="Two Content">
     <p:spTree>
       <p:nvGrpSpPr>
@@ -1017,7 +1017,7 @@
           <a:p>
             <a:fld id="{1D8BD707-D9CF-40AE-B4C6-C98DA3205C09}" type="datetimeFigureOut">
               <a:rPr lang="en-US"/>
-              <a:t>5/7/24</a:t>
+              <a:t>5/8/24</a:t>
             </a:fld>
             <a:endParaRPr lang="en-US"/>
           </a:p>
@@ -1064,7 +1064,7 @@
 </file>
 
 <file path=ppt/slideLayouts/slideLayout4.xml><?xml version="1.0" encoding="utf-8"?>
-<p:sldLayout xmlns:a="http://schemas.openxmlformats.org/drawingml/2006/main" xmlns:r="http://schemas.openxmlformats.org/officeDocument/2006/relationships" xmlns:p="http://schemas.openxmlformats.org/presentationml/2006/main" type="obj" preserve="1">
+<p:sldLayout xmlns:a="http://schemas.openxmlformats.org/drawingml/2006/main" xmlns:r="http://schemas.openxmlformats.org/officeDocument/2006/relationships" xmlns:p="http://schemas.openxmlformats.org/presentationml/2006/main" showMasterSp="0" type="obj" preserve="1">
   <p:cSld name="Title Only">
     <p:spTree>
       <p:nvGrpSpPr>
@@ -1159,7 +1159,7 @@
           <a:p>
             <a:fld id="{1D8BD707-D9CF-40AE-B4C6-C98DA3205C09}" type="datetimeFigureOut">
               <a:rPr lang="en-US"/>
-              <a:t>5/7/24</a:t>
+              <a:t>5/8/24</a:t>
             </a:fld>
             <a:endParaRPr lang="en-US"/>
           </a:p>
@@ -1206,7 +1206,7 @@
 </file>
 
 <file path=ppt/slideLayouts/slideLayout5.xml><?xml version="1.0" encoding="utf-8"?>
-<p:sldLayout xmlns:a="http://schemas.openxmlformats.org/drawingml/2006/main" xmlns:r="http://schemas.openxmlformats.org/officeDocument/2006/relationships" xmlns:p="http://schemas.openxmlformats.org/presentationml/2006/main" type="obj" preserve="1">
+<p:sldLayout xmlns:a="http://schemas.openxmlformats.org/drawingml/2006/main" xmlns:r="http://schemas.openxmlformats.org/officeDocument/2006/relationships" xmlns:p="http://schemas.openxmlformats.org/presentationml/2006/main" showMasterSp="0" type="obj" preserve="1">
   <p:cSld name="Blank">
     <p:spTree>
       <p:nvGrpSpPr>
@@ -1278,7 +1278,7 @@
           <a:p>
             <a:fld id="{1D8BD707-D9CF-40AE-B4C6-C98DA3205C09}" type="datetimeFigureOut">
               <a:rPr lang="en-US"/>
-              <a:t>5/7/24</a:t>
+              <a:t>5/8/24</a:t>
             </a:fld>
             <a:endParaRPr lang="en-US"/>
           </a:p>
@@ -2491,7 +2491,7 @@
           <a:p>
             <a:fld id="{1D8BD707-D9CF-40AE-B4C6-C98DA3205C09}" type="datetimeFigureOut">
               <a:rPr lang="en-US"/>
-              <a:t>5/7/24</a:t>
+              <a:t>5/8/24</a:t>
             </a:fld>
             <a:endParaRPr lang="en-US"/>
           </a:p>
@@ -2694,7 +2694,7 @@
 </file>
 
 <file path=ppt/slides/slide1.xml><?xml version="1.0" encoding="utf-8"?>
-<p:sld xmlns:a="http://schemas.openxmlformats.org/drawingml/2006/main" xmlns:r="http://schemas.openxmlformats.org/officeDocument/2006/relationships" xmlns:p="http://schemas.openxmlformats.org/presentationml/2006/main">
+<p:sld xmlns:a="http://schemas.openxmlformats.org/drawingml/2006/main" xmlns:r="http://schemas.openxmlformats.org/officeDocument/2006/relationships" xmlns:p="http://schemas.openxmlformats.org/presentationml/2006/main" showMasterSp="0">
   <p:cSld>
     <p:spTree>
       <p:nvGrpSpPr>
@@ -3696,7 +3696,7 @@
 </file>
 
 <file path=ppt/slides/slide2.xml><?xml version="1.0" encoding="utf-8"?>
-<p:sld xmlns:a="http://schemas.openxmlformats.org/drawingml/2006/main" xmlns:r="http://schemas.openxmlformats.org/officeDocument/2006/relationships" xmlns:p="http://schemas.openxmlformats.org/presentationml/2006/main">
+<p:sld xmlns:a="http://schemas.openxmlformats.org/drawingml/2006/main" xmlns:r="http://schemas.openxmlformats.org/officeDocument/2006/relationships" xmlns:p="http://schemas.openxmlformats.org/presentationml/2006/main" showMasterSp="0">
   <p:cSld>
     <p:spTree>
       <p:nvGrpSpPr>
@@ -4578,7 +4578,7 @@
 </file>
 
 <file path=ppt/slides/slide3.xml><?xml version="1.0" encoding="utf-8"?>
-<p:sld xmlns:a="http://schemas.openxmlformats.org/drawingml/2006/main" xmlns:r="http://schemas.openxmlformats.org/officeDocument/2006/relationships" xmlns:p="http://schemas.openxmlformats.org/presentationml/2006/main">
+<p:sld xmlns:a="http://schemas.openxmlformats.org/drawingml/2006/main" xmlns:r="http://schemas.openxmlformats.org/officeDocument/2006/relationships" xmlns:p="http://schemas.openxmlformats.org/presentationml/2006/main" showMasterSp="0">
   <p:cSld>
     <p:spTree>
       <p:nvGrpSpPr>
@@ -5460,7 +5460,7 @@
 </file>
 
 <file path=ppt/slides/slide4.xml><?xml version="1.0" encoding="utf-8"?>
-<p:sld xmlns:a="http://schemas.openxmlformats.org/drawingml/2006/main" xmlns:r="http://schemas.openxmlformats.org/officeDocument/2006/relationships" xmlns:p="http://schemas.openxmlformats.org/presentationml/2006/main">
+<p:sld xmlns:a="http://schemas.openxmlformats.org/drawingml/2006/main" xmlns:r="http://schemas.openxmlformats.org/officeDocument/2006/relationships" xmlns:p="http://schemas.openxmlformats.org/presentationml/2006/main" showMasterSp="0">
   <p:cSld>
     <p:spTree>
       <p:nvGrpSpPr>
@@ -6342,7 +6342,7 @@
 </file>
 
 <file path=ppt/slides/slide5.xml><?xml version="1.0" encoding="utf-8"?>
-<p:sld xmlns:a="http://schemas.openxmlformats.org/drawingml/2006/main" xmlns:r="http://schemas.openxmlformats.org/officeDocument/2006/relationships" xmlns:p="http://schemas.openxmlformats.org/presentationml/2006/main">
+<p:sld xmlns:a="http://schemas.openxmlformats.org/drawingml/2006/main" xmlns:r="http://schemas.openxmlformats.org/officeDocument/2006/relationships" xmlns:p="http://schemas.openxmlformats.org/presentationml/2006/main" showMasterSp="0">
   <p:cSld>
     <p:spTree>
       <p:nvGrpSpPr>

</xml_diff>